<commit_message>
updated buy now button
</commit_message>
<xml_diff>
--- a/_posts/how-to-architect-enterprise-single-page-applications-part-1/images/images.pptx
+++ b/_posts/how-to-architect-enterprise-single-page-applications-part-1/images/images.pptx
@@ -212,7 +212,7 @@
           <a:p>
             <a:fld id="{62924530-CF84-1B40-843A-DCBB2D2C09C6}" type="datetimeFigureOut">
               <a:rPr lang="en-US" smtClean="0"/>
-              <a:t>5/23/17</a:t>
+              <a:t>5/30/17</a:t>
             </a:fld>
             <a:endParaRPr lang="en-US" dirty="0"/>
           </a:p>
@@ -661,7 +661,7 @@
           <a:p>
             <a:fld id="{32612CC4-9DB0-CC43-B1FC-8D75BA765907}" type="datetimeFigureOut">
               <a:rPr lang="en-US" smtClean="0"/>
-              <a:t>5/23/17</a:t>
+              <a:t>5/30/17</a:t>
             </a:fld>
             <a:endParaRPr lang="en-US" dirty="0"/>
           </a:p>
@@ -831,7 +831,7 @@
           <a:p>
             <a:fld id="{32612CC4-9DB0-CC43-B1FC-8D75BA765907}" type="datetimeFigureOut">
               <a:rPr lang="en-US" smtClean="0"/>
-              <a:t>5/23/17</a:t>
+              <a:t>5/30/17</a:t>
             </a:fld>
             <a:endParaRPr lang="en-US" dirty="0"/>
           </a:p>
@@ -1011,7 +1011,7 @@
           <a:p>
             <a:fld id="{32612CC4-9DB0-CC43-B1FC-8D75BA765907}" type="datetimeFigureOut">
               <a:rPr lang="en-US" smtClean="0"/>
-              <a:t>5/23/17</a:t>
+              <a:t>5/30/17</a:t>
             </a:fld>
             <a:endParaRPr lang="en-US" dirty="0"/>
           </a:p>
@@ -1181,7 +1181,7 @@
           <a:p>
             <a:fld id="{32612CC4-9DB0-CC43-B1FC-8D75BA765907}" type="datetimeFigureOut">
               <a:rPr lang="en-US" smtClean="0"/>
-              <a:t>5/23/17</a:t>
+              <a:t>5/30/17</a:t>
             </a:fld>
             <a:endParaRPr lang="en-US" dirty="0"/>
           </a:p>
@@ -1427,7 +1427,7 @@
           <a:p>
             <a:fld id="{32612CC4-9DB0-CC43-B1FC-8D75BA765907}" type="datetimeFigureOut">
               <a:rPr lang="en-US" smtClean="0"/>
-              <a:t>5/23/17</a:t>
+              <a:t>5/30/17</a:t>
             </a:fld>
             <a:endParaRPr lang="en-US" dirty="0"/>
           </a:p>
@@ -1715,7 +1715,7 @@
           <a:p>
             <a:fld id="{32612CC4-9DB0-CC43-B1FC-8D75BA765907}" type="datetimeFigureOut">
               <a:rPr lang="en-US" smtClean="0"/>
-              <a:t>5/23/17</a:t>
+              <a:t>5/30/17</a:t>
             </a:fld>
             <a:endParaRPr lang="en-US" dirty="0"/>
           </a:p>
@@ -2137,7 +2137,7 @@
           <a:p>
             <a:fld id="{32612CC4-9DB0-CC43-B1FC-8D75BA765907}" type="datetimeFigureOut">
               <a:rPr lang="en-US" smtClean="0"/>
-              <a:t>5/23/17</a:t>
+              <a:t>5/30/17</a:t>
             </a:fld>
             <a:endParaRPr lang="en-US" dirty="0"/>
           </a:p>
@@ -2255,7 +2255,7 @@
           <a:p>
             <a:fld id="{32612CC4-9DB0-CC43-B1FC-8D75BA765907}" type="datetimeFigureOut">
               <a:rPr lang="en-US" smtClean="0"/>
-              <a:t>5/23/17</a:t>
+              <a:t>5/30/17</a:t>
             </a:fld>
             <a:endParaRPr lang="en-US" dirty="0"/>
           </a:p>
@@ -2350,7 +2350,7 @@
           <a:p>
             <a:fld id="{32612CC4-9DB0-CC43-B1FC-8D75BA765907}" type="datetimeFigureOut">
               <a:rPr lang="en-US" smtClean="0"/>
-              <a:t>5/23/17</a:t>
+              <a:t>5/30/17</a:t>
             </a:fld>
             <a:endParaRPr lang="en-US" dirty="0"/>
           </a:p>
@@ -2627,7 +2627,7 @@
           <a:p>
             <a:fld id="{32612CC4-9DB0-CC43-B1FC-8D75BA765907}" type="datetimeFigureOut">
               <a:rPr lang="en-US" smtClean="0"/>
-              <a:t>5/23/17</a:t>
+              <a:t>5/30/17</a:t>
             </a:fld>
             <a:endParaRPr lang="en-US" dirty="0"/>
           </a:p>
@@ -2880,7 +2880,7 @@
           <a:p>
             <a:fld id="{32612CC4-9DB0-CC43-B1FC-8D75BA765907}" type="datetimeFigureOut">
               <a:rPr lang="en-US" smtClean="0"/>
-              <a:t>5/23/17</a:t>
+              <a:t>5/30/17</a:t>
             </a:fld>
             <a:endParaRPr lang="en-US" dirty="0"/>
           </a:p>
@@ -3093,7 +3093,7 @@
           <a:p>
             <a:fld id="{32612CC4-9DB0-CC43-B1FC-8D75BA765907}" type="datetimeFigureOut">
               <a:rPr lang="en-US" smtClean="0"/>
-              <a:t>5/23/17</a:t>
+              <a:t>5/30/17</a:t>
             </a:fld>
             <a:endParaRPr lang="en-US" dirty="0"/>
           </a:p>
@@ -4493,7 +4493,7 @@
         </p:nvSpPr>
         <p:spPr>
           <a:xfrm>
-            <a:off x="5474207" y="1308100"/>
+            <a:off x="5151479" y="783667"/>
             <a:ext cx="2986381" cy="1800885"/>
           </a:xfrm>
           <a:prstGeom prst="rect">
@@ -4542,7 +4542,7 @@
         </p:nvSpPr>
         <p:spPr>
           <a:xfrm>
-            <a:off x="989731" y="2258714"/>
+            <a:off x="667003" y="1734281"/>
             <a:ext cx="2986381" cy="3380085"/>
           </a:xfrm>
           <a:prstGeom prst="rect">
@@ -4591,7 +4591,7 @@
         </p:nvSpPr>
         <p:spPr>
           <a:xfrm>
-            <a:off x="1111651" y="2457481"/>
+            <a:off x="788923" y="1933048"/>
             <a:ext cx="2766926" cy="613382"/>
           </a:xfrm>
           <a:prstGeom prst="rect">
@@ -4646,7 +4646,7 @@
         </p:nvSpPr>
         <p:spPr>
           <a:xfrm>
-            <a:off x="5486907" y="4044763"/>
+            <a:off x="5164179" y="3520330"/>
             <a:ext cx="2986381" cy="1772317"/>
           </a:xfrm>
           <a:prstGeom prst="rect">
@@ -4699,7 +4699,7 @@
         </p:nvSpPr>
         <p:spPr>
           <a:xfrm>
-            <a:off x="1111651" y="3155239"/>
+            <a:off x="788923" y="2630806"/>
             <a:ext cx="2766926" cy="524918"/>
           </a:xfrm>
           <a:prstGeom prst="rect">
@@ -4755,7 +4755,7 @@
         </p:nvSpPr>
         <p:spPr>
           <a:xfrm>
-            <a:off x="1811135" y="1813033"/>
+            <a:off x="1488407" y="1288600"/>
             <a:ext cx="2164977" cy="369332"/>
           </a:xfrm>
           <a:prstGeom prst="rect">
@@ -4785,7 +4785,7 @@
         </p:nvSpPr>
         <p:spPr>
           <a:xfrm>
-            <a:off x="6060283" y="4080972"/>
+            <a:off x="5737555" y="3556539"/>
             <a:ext cx="1804416" cy="531745"/>
           </a:xfrm>
           <a:prstGeom prst="rect">
@@ -4840,7 +4840,7 @@
         </p:nvCxnSpPr>
         <p:spPr>
           <a:xfrm>
-            <a:off x="6962491" y="3101896"/>
+            <a:off x="6639763" y="2577463"/>
             <a:ext cx="17607" cy="942867"/>
           </a:xfrm>
           <a:prstGeom prst="straightConnector1">
@@ -4878,7 +4878,7 @@
         </p:nvSpPr>
         <p:spPr>
           <a:xfrm>
-            <a:off x="1099458" y="3764533"/>
+            <a:off x="776730" y="3240100"/>
             <a:ext cx="2766926" cy="524918"/>
           </a:xfrm>
           <a:prstGeom prst="rect">
@@ -4934,7 +4934,7 @@
         </p:nvSpPr>
         <p:spPr>
           <a:xfrm>
-            <a:off x="1098951" y="4365801"/>
+            <a:off x="776223" y="3841368"/>
             <a:ext cx="2766926" cy="524918"/>
           </a:xfrm>
           <a:prstGeom prst="rect">
@@ -4990,7 +4990,7 @@
         </p:nvSpPr>
         <p:spPr>
           <a:xfrm>
-            <a:off x="5486907" y="5850675"/>
+            <a:off x="5164179" y="5326242"/>
             <a:ext cx="2164977" cy="369332"/>
           </a:xfrm>
           <a:prstGeom prst="rect">
@@ -5020,7 +5020,7 @@
         </p:nvSpPr>
         <p:spPr>
           <a:xfrm>
-            <a:off x="5596634" y="1418014"/>
+            <a:off x="5273906" y="893581"/>
             <a:ext cx="2766926" cy="301719"/>
           </a:xfrm>
           <a:prstGeom prst="rect">
@@ -5075,7 +5075,7 @@
         </p:nvSpPr>
         <p:spPr>
           <a:xfrm>
-            <a:off x="5596634" y="1822396"/>
+            <a:off x="5273906" y="1297963"/>
             <a:ext cx="2766926" cy="295612"/>
           </a:xfrm>
           <a:prstGeom prst="rect">
@@ -5131,7 +5131,7 @@
         </p:nvSpPr>
         <p:spPr>
           <a:xfrm>
-            <a:off x="5579028" y="2223420"/>
+            <a:off x="5256300" y="1698987"/>
             <a:ext cx="2766926" cy="353201"/>
           </a:xfrm>
           <a:prstGeom prst="rect">
@@ -5187,7 +5187,7 @@
         </p:nvSpPr>
         <p:spPr>
           <a:xfrm>
-            <a:off x="5579028" y="2660453"/>
+            <a:off x="5256300" y="2136020"/>
             <a:ext cx="2766926" cy="372875"/>
           </a:xfrm>
           <a:prstGeom prst="rect">
@@ -5243,7 +5243,7 @@
         </p:nvSpPr>
         <p:spPr>
           <a:xfrm>
-            <a:off x="5474207" y="896852"/>
+            <a:off x="5151479" y="372419"/>
             <a:ext cx="2534167" cy="369332"/>
           </a:xfrm>
           <a:prstGeom prst="rect">
@@ -5273,7 +5273,7 @@
         </p:nvCxnSpPr>
         <p:spPr>
           <a:xfrm flipV="1">
-            <a:off x="3877056" y="1612900"/>
+            <a:off x="3554328" y="1088467"/>
             <a:ext cx="1701972" cy="909973"/>
           </a:xfrm>
           <a:prstGeom prst="straightConnector1">
@@ -5311,7 +5311,7 @@
         </p:nvSpPr>
         <p:spPr>
           <a:xfrm>
-            <a:off x="1111651" y="4983121"/>
+            <a:off x="788923" y="4458688"/>
             <a:ext cx="2766926" cy="524918"/>
           </a:xfrm>
           <a:prstGeom prst="rect">
@@ -5364,7 +5364,7 @@
         </p:nvCxnSpPr>
         <p:spPr>
           <a:xfrm flipV="1">
-            <a:off x="3784935" y="4411949"/>
+            <a:off x="3462207" y="3887516"/>
             <a:ext cx="2158665" cy="933757"/>
           </a:xfrm>
           <a:prstGeom prst="straightConnector1">
@@ -5402,7 +5402,7 @@
         </p:nvCxnSpPr>
         <p:spPr>
           <a:xfrm flipV="1">
-            <a:off x="3880524" y="1993856"/>
+            <a:off x="3557796" y="1469423"/>
             <a:ext cx="1692739" cy="1461845"/>
           </a:xfrm>
           <a:prstGeom prst="straightConnector1">
@@ -5440,7 +5440,7 @@
         </p:nvCxnSpPr>
         <p:spPr>
           <a:xfrm flipV="1">
-            <a:off x="3903895" y="2419979"/>
+            <a:off x="3581167" y="1895546"/>
             <a:ext cx="1665900" cy="1629539"/>
           </a:xfrm>
           <a:prstGeom prst="straightConnector1">
@@ -5478,7 +5478,7 @@
         </p:nvCxnSpPr>
         <p:spPr>
           <a:xfrm flipV="1">
-            <a:off x="3881484" y="2869589"/>
+            <a:off x="3558756" y="2345156"/>
             <a:ext cx="1688311" cy="1801700"/>
           </a:xfrm>
           <a:prstGeom prst="straightConnector1">
@@ -5492,6 +5492,96 @@
             </a:solidFill>
             <a:tailEnd type="triangle"/>
           </a:ln>
+        </p:spPr>
+        <p:style>
+          <a:lnRef idx="2">
+            <a:schemeClr val="accent1"/>
+          </a:lnRef>
+          <a:fillRef idx="0">
+            <a:schemeClr val="accent1"/>
+          </a:fillRef>
+          <a:effectRef idx="1">
+            <a:schemeClr val="accent1"/>
+          </a:effectRef>
+          <a:fontRef idx="minor">
+            <a:schemeClr val="tx1"/>
+          </a:fontRef>
+        </p:style>
+      </p:cxnSp>
+      <p:sp>
+        <p:nvSpPr>
+          <p:cNvPr id="24" name="TextBox 23"/>
+          <p:cNvSpPr txBox="1"/>
+          <p:nvPr/>
+        </p:nvSpPr>
+        <p:spPr>
+          <a:xfrm>
+            <a:off x="667003" y="6155308"/>
+            <a:ext cx="2164977" cy="369332"/>
+          </a:xfrm>
+          <a:prstGeom prst="rect">
+            <a:avLst/>
+          </a:prstGeom>
+          <a:noFill/>
+        </p:spPr>
+        <p:txBody>
+          <a:bodyPr wrap="square" rtlCol="0">
+            <a:spAutoFit/>
+          </a:bodyPr>
+          <a:lstStyle/>
+          <a:p>
+            <a:r>
+              <a:rPr lang="en-US" dirty="0" smtClean="0"/>
+              <a:t>Before</a:t>
+            </a:r>
+            <a:endParaRPr lang="en-US" dirty="0"/>
+          </a:p>
+        </p:txBody>
+      </p:sp>
+      <p:sp>
+        <p:nvSpPr>
+          <p:cNvPr id="26" name="TextBox 25"/>
+          <p:cNvSpPr txBox="1"/>
+          <p:nvPr/>
+        </p:nvSpPr>
+        <p:spPr>
+          <a:xfrm>
+            <a:off x="5164179" y="6154766"/>
+            <a:ext cx="2164977" cy="369332"/>
+          </a:xfrm>
+          <a:prstGeom prst="rect">
+            <a:avLst/>
+          </a:prstGeom>
+          <a:noFill/>
+        </p:spPr>
+        <p:txBody>
+          <a:bodyPr wrap="square" rtlCol="0">
+            <a:spAutoFit/>
+          </a:bodyPr>
+          <a:lstStyle/>
+          <a:p>
+            <a:r>
+              <a:rPr lang="en-US" dirty="0" smtClean="0"/>
+              <a:t>After</a:t>
+            </a:r>
+            <a:endParaRPr lang="en-US" dirty="0"/>
+          </a:p>
+        </p:txBody>
+      </p:sp>
+      <p:cxnSp>
+        <p:nvCxnSpPr>
+          <p:cNvPr id="3" name="Straight Connector 2"/>
+          <p:cNvCxnSpPr/>
+          <p:nvPr/>
+        </p:nvCxnSpPr>
+        <p:spPr>
+          <a:xfrm>
+            <a:off x="470647" y="5997388"/>
+            <a:ext cx="8175812" cy="0"/>
+          </a:xfrm>
+          <a:prstGeom prst="line">
+            <a:avLst/>
+          </a:prstGeom>
         </p:spPr>
         <p:style>
           <a:lnRef idx="2">

</xml_diff>